<commit_message>
Deployed 944e8d4 with MkDocs version: 1.5.3
</commit_message>
<xml_diff>
--- a/class_hierarchy.pptx
+++ b/class_hierarchy.pptx
@@ -3376,7 +3376,7 @@
         </p:nvSpPr>
         <p:spPr>
           <a:xfrm>
-            <a:off x="1271237" y="1192530"/>
+            <a:off x="2258379" y="1540907"/>
             <a:ext cx="1383030" cy="369332"/>
           </a:xfrm>
           <a:prstGeom prst="rect">
@@ -3417,7 +3417,7 @@
         </p:nvSpPr>
         <p:spPr>
           <a:xfrm>
-            <a:off x="1271237" y="1927860"/>
+            <a:off x="2258379" y="2276237"/>
             <a:ext cx="1383030" cy="369332"/>
           </a:xfrm>
           <a:prstGeom prst="rect">
@@ -3458,7 +3458,7 @@
         </p:nvSpPr>
         <p:spPr>
           <a:xfrm>
-            <a:off x="1271237" y="2663190"/>
+            <a:off x="2258379" y="3011567"/>
             <a:ext cx="1383030" cy="369332"/>
           </a:xfrm>
           <a:prstGeom prst="rect">
@@ -3499,7 +3499,7 @@
         </p:nvSpPr>
         <p:spPr>
           <a:xfrm>
-            <a:off x="1271237" y="3398520"/>
+            <a:off x="2258379" y="3746897"/>
             <a:ext cx="1383030" cy="369332"/>
           </a:xfrm>
           <a:prstGeom prst="rect">
@@ -3540,7 +3540,7 @@
         </p:nvSpPr>
         <p:spPr>
           <a:xfrm>
-            <a:off x="1271237" y="4133850"/>
+            <a:off x="2258379" y="4482227"/>
             <a:ext cx="1383030" cy="369332"/>
           </a:xfrm>
           <a:prstGeom prst="rect">
@@ -3581,7 +3581,7 @@
         </p:nvSpPr>
         <p:spPr>
           <a:xfrm>
-            <a:off x="6076950" y="1375410"/>
+            <a:off x="5093970" y="1977390"/>
             <a:ext cx="1383030" cy="369332"/>
           </a:xfrm>
           <a:prstGeom prst="rect">
@@ -3622,7 +3622,7 @@
         </p:nvSpPr>
         <p:spPr>
           <a:xfrm>
-            <a:off x="6076950" y="2110740"/>
+            <a:off x="5093970" y="2712720"/>
             <a:ext cx="1383030" cy="369332"/>
           </a:xfrm>
           <a:prstGeom prst="rect">
@@ -3663,7 +3663,7 @@
         </p:nvSpPr>
         <p:spPr>
           <a:xfrm>
-            <a:off x="6076950" y="2846070"/>
+            <a:off x="5093970" y="3448050"/>
             <a:ext cx="1383030" cy="369332"/>
           </a:xfrm>
           <a:prstGeom prst="rect">
@@ -3707,7 +3707,7 @@
         </p:nvCxnSpPr>
         <p:spPr>
           <a:xfrm>
-            <a:off x="1962752" y="1561862"/>
+            <a:off x="2949894" y="1910239"/>
             <a:ext cx="0" cy="365998"/>
           </a:xfrm>
           <a:prstGeom prst="straightConnector1">
@@ -3746,7 +3746,7 @@
         </p:nvCxnSpPr>
         <p:spPr>
           <a:xfrm>
-            <a:off x="1962752" y="2297192"/>
+            <a:off x="2949894" y="2645569"/>
             <a:ext cx="0" cy="365998"/>
           </a:xfrm>
           <a:prstGeom prst="straightConnector1">
@@ -3785,7 +3785,7 @@
         </p:nvCxnSpPr>
         <p:spPr>
           <a:xfrm>
-            <a:off x="1962752" y="3032522"/>
+            <a:off x="2949894" y="3380899"/>
             <a:ext cx="0" cy="365998"/>
           </a:xfrm>
           <a:prstGeom prst="straightConnector1">
@@ -3824,7 +3824,7 @@
         </p:nvCxnSpPr>
         <p:spPr>
           <a:xfrm>
-            <a:off x="1976087" y="3767852"/>
+            <a:off x="2963229" y="4116229"/>
             <a:ext cx="0" cy="365998"/>
           </a:xfrm>
           <a:prstGeom prst="straightConnector1">
@@ -3863,7 +3863,7 @@
         </p:nvCxnSpPr>
         <p:spPr>
           <a:xfrm>
-            <a:off x="6757035" y="1744742"/>
+            <a:off x="5774055" y="2346722"/>
             <a:ext cx="0" cy="365998"/>
           </a:xfrm>
           <a:prstGeom prst="straightConnector1">
@@ -3902,7 +3902,7 @@
         </p:nvCxnSpPr>
         <p:spPr>
           <a:xfrm>
-            <a:off x="6757035" y="2480072"/>
+            <a:off x="5774055" y="3082052"/>
             <a:ext cx="0" cy="365998"/>
           </a:xfrm>
           <a:prstGeom prst="straightConnector1">
@@ -3945,8 +3945,8 @@
         </p:nvCxnSpPr>
         <p:spPr>
           <a:xfrm flipH="1">
-            <a:off x="1963918" y="836533"/>
-            <a:ext cx="2702028" cy="203597"/>
+            <a:off x="2951060" y="836533"/>
+            <a:ext cx="1714886" cy="551974"/>
           </a:xfrm>
           <a:prstGeom prst="straightConnector1">
             <a:avLst/>
@@ -3989,7 +3989,7 @@
         <p:spPr>
           <a:xfrm>
             <a:off x="4665946" y="836533"/>
-            <a:ext cx="2954793" cy="369332"/>
+            <a:ext cx="1971813" cy="971312"/>
           </a:xfrm>
           <a:prstGeom prst="straightConnector1">
             <a:avLst/>
@@ -4027,7 +4027,7 @@
         </p:nvSpPr>
         <p:spPr>
           <a:xfrm>
-            <a:off x="1094499" y="1040130"/>
+            <a:off x="2081641" y="1388507"/>
             <a:ext cx="1738837" cy="3600450"/>
           </a:xfrm>
           <a:prstGeom prst="rect">
@@ -4074,7 +4074,7 @@
         </p:nvSpPr>
         <p:spPr>
           <a:xfrm>
-            <a:off x="1331127" y="653653"/>
+            <a:off x="2318269" y="1002030"/>
             <a:ext cx="1381981" cy="369332"/>
           </a:xfrm>
           <a:prstGeom prst="rect">
@@ -4109,7 +4109,7 @@
         </p:nvSpPr>
         <p:spPr>
           <a:xfrm>
-            <a:off x="5948887" y="1205865"/>
+            <a:off x="4965907" y="1807845"/>
             <a:ext cx="3343703" cy="2223135"/>
           </a:xfrm>
           <a:prstGeom prst="rect">
@@ -4156,7 +4156,7 @@
         </p:nvSpPr>
         <p:spPr>
           <a:xfrm>
-            <a:off x="6754642" y="836533"/>
+            <a:off x="5771662" y="1438513"/>
             <a:ext cx="1697901" cy="369332"/>
           </a:xfrm>
           <a:prstGeom prst="rect">
@@ -4191,7 +4191,7 @@
         </p:nvSpPr>
         <p:spPr>
           <a:xfrm>
-            <a:off x="7770495" y="1375410"/>
+            <a:off x="6787515" y="1977390"/>
             <a:ext cx="1383030" cy="369332"/>
           </a:xfrm>
           <a:prstGeom prst="rect">
@@ -4232,7 +4232,7 @@
         </p:nvSpPr>
         <p:spPr>
           <a:xfrm>
-            <a:off x="7770495" y="2106215"/>
+            <a:off x="6787515" y="2708195"/>
             <a:ext cx="1383030" cy="369332"/>
           </a:xfrm>
           <a:prstGeom prst="rect">
@@ -4273,7 +4273,7 @@
         </p:nvSpPr>
         <p:spPr>
           <a:xfrm>
-            <a:off x="7770495" y="2847617"/>
+            <a:off x="6787515" y="3449597"/>
             <a:ext cx="1383030" cy="369332"/>
           </a:xfrm>
           <a:prstGeom prst="rect">
@@ -4359,8 +4359,8 @@
         </p:nvCxnSpPr>
         <p:spPr>
           <a:xfrm>
-            <a:off x="1963918" y="4640580"/>
-            <a:ext cx="2702028" cy="884396"/>
+            <a:off x="2951060" y="4988957"/>
+            <a:ext cx="1714886" cy="536019"/>
           </a:xfrm>
           <a:prstGeom prst="straightConnector1">
             <a:avLst/>
@@ -4402,8 +4402,8 @@
         </p:nvCxnSpPr>
         <p:spPr>
           <a:xfrm flipH="1">
-            <a:off x="4665946" y="3429000"/>
-            <a:ext cx="2954793" cy="2095976"/>
+            <a:off x="4665946" y="4030980"/>
+            <a:ext cx="1971813" cy="1493996"/>
           </a:xfrm>
           <a:prstGeom prst="straightConnector1">
             <a:avLst/>

</xml_diff>